<commit_message>
modiffy the animation a little bit
</commit_message>
<xml_diff>
--- a/PresentationSlides/Presentation.pptx
+++ b/PresentationSlides/Presentation.pptx
@@ -124,7 +124,7 @@
   </p:defaultTextStyle>
   <p:extLst>
     <p:ext uri="{EFAFB233-063F-42B5-8137-9DF3F51BA10A}">
-      <p15:sldGuideLst xmlns:p15="http://schemas.microsoft.com/office/powerpoint/2012/main" xmlns="">
+      <p15:sldGuideLst xmlns:p15="http://schemas.microsoft.com/office/powerpoint/2012/main">
         <p15:guide id="1" orient="horz" pos="2160">
           <p15:clr>
             <a:srgbClr val="A4A3A4"/>
@@ -146,7 +146,7 @@
   <p:cmAuthor id="1" name="Happier LIU" initials="HL" lastIdx="6" clrIdx="0">
     <p:extLst>
       <p:ext uri="{19B8F6BF-5375-455C-9EA6-DF929625EA0E}">
-        <p15:presenceInfo xmlns:p15="http://schemas.microsoft.com/office/powerpoint/2012/main" xmlns="" userId="dfbd9b513a1915c0" providerId="Windows Live"/>
+        <p15:presenceInfo xmlns:p15="http://schemas.microsoft.com/office/powerpoint/2012/main" userId="dfbd9b513a1915c0" providerId="Windows Live"/>
       </p:ext>
     </p:extLst>
   </p:cmAuthor>
@@ -235,7 +235,7 @@
           <a:p>
             <a:fld id="{A4F31AE2-B6D5-4905-8CC5-C746D3DE137B}" type="datetimeFigureOut">
               <a:rPr lang="en-US" smtClean="0"/>
-              <a:t>12-12-02</a:t>
+              <a:t>12/2/2012</a:t>
             </a:fld>
             <a:endParaRPr lang="en-US"/>
           </a:p>
@@ -768,7 +768,7 @@
           <a:p>
             <a:fld id="{578C8EFD-E150-CA4D-905C-A94D1A78A82A}" type="datetime1">
               <a:rPr lang="en-CA" smtClean="0"/>
-              <a:t>12-12-02</a:t>
+              <a:t>2012-12-02</a:t>
             </a:fld>
             <a:endParaRPr lang="en-US"/>
           </a:p>
@@ -938,7 +938,7 @@
           <a:p>
             <a:fld id="{15D8ADF8-3441-5F45-A19B-D033F59CF17D}" type="datetime1">
               <a:rPr lang="en-CA" smtClean="0"/>
-              <a:t>12-12-02</a:t>
+              <a:t>2012-12-02</a:t>
             </a:fld>
             <a:endParaRPr lang="en-US"/>
           </a:p>
@@ -1118,7 +1118,7 @@
           <a:p>
             <a:fld id="{0AED5A46-46F0-524C-B118-2413C4B118F2}" type="datetime1">
               <a:rPr lang="en-CA" smtClean="0"/>
-              <a:t>12-12-02</a:t>
+              <a:t>2012-12-02</a:t>
             </a:fld>
             <a:endParaRPr lang="en-US"/>
           </a:p>
@@ -1288,7 +1288,7 @@
           <a:p>
             <a:fld id="{2FFAA75D-0121-8445-A2D5-37B4791018BB}" type="datetime1">
               <a:rPr lang="en-CA" smtClean="0"/>
-              <a:t>12-12-02</a:t>
+              <a:t>2012-12-02</a:t>
             </a:fld>
             <a:endParaRPr lang="en-US"/>
           </a:p>
@@ -1534,7 +1534,7 @@
           <a:p>
             <a:fld id="{53F7EAB1-141B-FB47-8AAB-E68313ADDAE7}" type="datetime1">
               <a:rPr lang="en-CA" smtClean="0"/>
-              <a:t>12-12-02</a:t>
+              <a:t>2012-12-02</a:t>
             </a:fld>
             <a:endParaRPr lang="en-US"/>
           </a:p>
@@ -1822,7 +1822,7 @@
           <a:p>
             <a:fld id="{7B50838B-1487-4842-81F1-BDF2A6D1F1B3}" type="datetime1">
               <a:rPr lang="en-CA" smtClean="0"/>
-              <a:t>12-12-02</a:t>
+              <a:t>2012-12-02</a:t>
             </a:fld>
             <a:endParaRPr lang="en-US"/>
           </a:p>
@@ -2244,7 +2244,7 @@
           <a:p>
             <a:fld id="{8597D41A-A37E-B94A-ABBE-66D061CC16A8}" type="datetime1">
               <a:rPr lang="en-CA" smtClean="0"/>
-              <a:t>12-12-02</a:t>
+              <a:t>2012-12-02</a:t>
             </a:fld>
             <a:endParaRPr lang="en-US"/>
           </a:p>
@@ -2362,7 +2362,7 @@
           <a:p>
             <a:fld id="{3E462AFF-A87A-3449-BF73-2E332730FBBD}" type="datetime1">
               <a:rPr lang="en-CA" smtClean="0"/>
-              <a:t>12-12-02</a:t>
+              <a:t>2012-12-02</a:t>
             </a:fld>
             <a:endParaRPr lang="en-US"/>
           </a:p>
@@ -2457,7 +2457,7 @@
           <a:p>
             <a:fld id="{61F0DCD8-522C-0E46-A196-33CF3C2A12C1}" type="datetime1">
               <a:rPr lang="en-CA" smtClean="0"/>
-              <a:t>12-12-02</a:t>
+              <a:t>2012-12-02</a:t>
             </a:fld>
             <a:endParaRPr lang="en-US"/>
           </a:p>
@@ -2734,7 +2734,7 @@
           <a:p>
             <a:fld id="{05556C25-90F2-064D-BF7A-B83AB86F67C5}" type="datetime1">
               <a:rPr lang="en-CA" smtClean="0"/>
-              <a:t>12-12-02</a:t>
+              <a:t>2012-12-02</a:t>
             </a:fld>
             <a:endParaRPr lang="en-US"/>
           </a:p>
@@ -2991,7 +2991,7 @@
           <a:p>
             <a:fld id="{D36A68E7-021F-D94A-BB37-798C61C4259E}" type="datetime1">
               <a:rPr lang="en-CA" smtClean="0"/>
-              <a:t>12-12-02</a:t>
+              <a:t>2012-12-02</a:t>
             </a:fld>
             <a:endParaRPr lang="en-US"/>
           </a:p>
@@ -3204,7 +3204,7 @@
           <a:p>
             <a:fld id="{740C5816-A486-5D43-AC42-C657B961AA99}" type="datetime1">
               <a:rPr lang="en-CA" smtClean="0"/>
-              <a:t>12-12-02</a:t>
+              <a:t>2012-12-02</a:t>
             </a:fld>
             <a:endParaRPr lang="en-US"/>
           </a:p>
@@ -3684,7 +3684,7 @@
   <p:timing>
     <p:tnLst>
       <p:par>
-        <p:cTn xmlns:p14="http://schemas.microsoft.com/office/powerpoint/2010/main" id="1" dur="indefinite" restart="never" nodeType="tmRoot"/>
+        <p:cTn id="1" dur="indefinite" restart="never" nodeType="tmRoot"/>
       </p:par>
     </p:tnLst>
   </p:timing>
@@ -3796,7 +3796,7 @@
   <p:timing>
     <p:tnLst>
       <p:par>
-        <p:cTn xmlns:p14="http://schemas.microsoft.com/office/powerpoint/2010/main" id="1" dur="indefinite" restart="never" nodeType="tmRoot"/>
+        <p:cTn id="1" dur="indefinite" restart="never" nodeType="tmRoot"/>
       </p:par>
     </p:tnLst>
   </p:timing>
@@ -3914,7 +3914,7 @@
   <p:timing>
     <p:tnLst>
       <p:par>
-        <p:cTn xmlns:p14="http://schemas.microsoft.com/office/powerpoint/2010/main" id="1" dur="indefinite" restart="never" nodeType="tmRoot"/>
+        <p:cTn id="1" dur="indefinite" restart="never" nodeType="tmRoot"/>
       </p:par>
     </p:tnLst>
   </p:timing>
@@ -4047,7 +4047,7 @@
   <p:timing>
     <p:tnLst>
       <p:par>
-        <p:cTn xmlns:p14="http://schemas.microsoft.com/office/powerpoint/2010/main" id="1" dur="indefinite" restart="never" nodeType="tmRoot"/>
+        <p:cTn id="1" dur="indefinite" restart="never" nodeType="tmRoot"/>
       </p:par>
     </p:tnLst>
   </p:timing>
@@ -4189,7 +4189,7 @@
   <p:timing>
     <p:tnLst>
       <p:par>
-        <p:cTn xmlns:p14="http://schemas.microsoft.com/office/powerpoint/2010/main" id="1" dur="indefinite" restart="never" nodeType="tmRoot"/>
+        <p:cTn id="1" dur="indefinite" restart="never" nodeType="tmRoot"/>
       </p:par>
     </p:tnLst>
   </p:timing>
@@ -4370,7 +4370,7 @@
   <p:timing>
     <p:tnLst>
       <p:par>
-        <p:cTn xmlns:p14="http://schemas.microsoft.com/office/powerpoint/2010/main" id="1" dur="indefinite" restart="never" nodeType="tmRoot"/>
+        <p:cTn id="1" dur="indefinite" restart="never" nodeType="tmRoot"/>
       </p:par>
     </p:tnLst>
   </p:timing>
@@ -4530,7 +4530,7 @@
   <p:timing>
     <p:tnLst>
       <p:par>
-        <p:cTn xmlns:p14="http://schemas.microsoft.com/office/powerpoint/2010/main" id="1" dur="indefinite" restart="never" nodeType="tmRoot"/>
+        <p:cTn id="1" dur="indefinite" restart="never" nodeType="tmRoot"/>
       </p:par>
     </p:tnLst>
   </p:timing>
@@ -4672,7 +4672,7 @@
   <p:timing>
     <p:tnLst>
       <p:par>
-        <p:cTn xmlns:p14="http://schemas.microsoft.com/office/powerpoint/2010/main" id="1" dur="indefinite" restart="never" nodeType="tmRoot"/>
+        <p:cTn id="1" dur="indefinite" restart="never" nodeType="tmRoot"/>
       </p:par>
     </p:tnLst>
   </p:timing>
@@ -4810,7 +4810,7 @@
   <p:timing>
     <p:tnLst>
       <p:par>
-        <p:cTn xmlns:p14="http://schemas.microsoft.com/office/powerpoint/2010/main" id="1" dur="indefinite" restart="never" nodeType="tmRoot"/>
+        <p:cTn id="1" dur="indefinite" restart="never" nodeType="tmRoot"/>
       </p:par>
     </p:tnLst>
   </p:timing>
@@ -4964,7 +4964,7 @@
   <p:timing>
     <p:tnLst>
       <p:par>
-        <p:cTn xmlns:p14="http://schemas.microsoft.com/office/powerpoint/2010/main" id="1" dur="indefinite" restart="never" nodeType="tmRoot"/>
+        <p:cTn id="1" dur="indefinite" restart="never" nodeType="tmRoot"/>
       </p:par>
     </p:tnLst>
   </p:timing>
@@ -5142,7 +5142,7 @@
   <p:timing>
     <p:tnLst>
       <p:par>
-        <p:cTn xmlns:p14="http://schemas.microsoft.com/office/powerpoint/2010/main" id="1" dur="indefinite" restart="never" nodeType="tmRoot"/>
+        <p:cTn id="1" dur="indefinite" restart="never" nodeType="tmRoot"/>
       </p:par>
     </p:tnLst>
   </p:timing>
@@ -5762,7 +5762,7 @@
   <p:timing>
     <p:tnLst>
       <p:par>
-        <p:cTn xmlns:p14="http://schemas.microsoft.com/office/powerpoint/2010/main" id="1" dur="indefinite" restart="never" nodeType="tmRoot">
+        <p:cTn id="1" dur="indefinite" restart="never" nodeType="tmRoot">
           <p:childTnLst>
             <p:seq concurrent="1" nextAc="seek">
               <p:cTn id="2" dur="indefinite" nodeType="mainSeq">
@@ -6410,7 +6410,7 @@
   <p:timing>
     <p:tnLst>
       <p:par>
-        <p:cTn xmlns:p14="http://schemas.microsoft.com/office/powerpoint/2010/main" id="1" dur="indefinite" restart="never" nodeType="tmRoot"/>
+        <p:cTn id="1" dur="indefinite" restart="never" nodeType="tmRoot"/>
       </p:par>
     </p:tnLst>
   </p:timing>
@@ -6738,124 +6738,6 @@
               <a:srgbClr val="FF0000"/>
             </a:solidFill>
             <a:tailEnd type="arrow"/>
-          </a:ln>
-        </p:spPr>
-        <p:style>
-          <a:lnRef idx="2">
-            <a:schemeClr val="accent1"/>
-          </a:lnRef>
-          <a:fillRef idx="0">
-            <a:schemeClr val="accent1"/>
-          </a:fillRef>
-          <a:effectRef idx="1">
-            <a:schemeClr val="accent1"/>
-          </a:effectRef>
-          <a:fontRef idx="minor">
-            <a:schemeClr val="tx1"/>
-          </a:fontRef>
-        </p:style>
-      </p:cxnSp>
-      <p:cxnSp>
-        <p:nvCxnSpPr>
-          <p:cNvPr id="11" name="Straight Arrow Connector 10"/>
-          <p:cNvCxnSpPr>
-            <a:endCxn id="8" idx="0"/>
-          </p:cNvCxnSpPr>
-          <p:nvPr/>
-        </p:nvCxnSpPr>
-        <p:spPr>
-          <a:xfrm flipH="1">
-            <a:off x="2252725" y="2936449"/>
-            <a:ext cx="1670790" cy="882459"/>
-          </a:xfrm>
-          <a:prstGeom prst="straightConnector1">
-            <a:avLst/>
-          </a:prstGeom>
-          <a:ln w="38100">
-            <a:solidFill>
-              <a:srgbClr val="008000"/>
-            </a:solidFill>
-            <a:headEnd type="arrow"/>
-            <a:tailEnd type="none"/>
-          </a:ln>
-        </p:spPr>
-        <p:style>
-          <a:lnRef idx="2">
-            <a:schemeClr val="accent1"/>
-          </a:lnRef>
-          <a:fillRef idx="0">
-            <a:schemeClr val="accent1"/>
-          </a:fillRef>
-          <a:effectRef idx="1">
-            <a:schemeClr val="accent1"/>
-          </a:effectRef>
-          <a:fontRef idx="minor">
-            <a:schemeClr val="tx1"/>
-          </a:fontRef>
-        </p:style>
-      </p:cxnSp>
-      <p:cxnSp>
-        <p:nvCxnSpPr>
-          <p:cNvPr id="12" name="Straight Arrow Connector 11"/>
-          <p:cNvCxnSpPr>
-            <a:stCxn id="5" idx="2"/>
-            <a:endCxn id="7" idx="0"/>
-          </p:cNvCxnSpPr>
-          <p:nvPr/>
-        </p:nvCxnSpPr>
-        <p:spPr>
-          <a:xfrm>
-            <a:off x="4575544" y="3175287"/>
-            <a:ext cx="0" cy="643621"/>
-          </a:xfrm>
-          <a:prstGeom prst="straightConnector1">
-            <a:avLst/>
-          </a:prstGeom>
-          <a:ln w="38100">
-            <a:solidFill>
-              <a:srgbClr val="008000"/>
-            </a:solidFill>
-            <a:headEnd type="arrow"/>
-            <a:tailEnd type="none"/>
-          </a:ln>
-        </p:spPr>
-        <p:style>
-          <a:lnRef idx="2">
-            <a:schemeClr val="accent1"/>
-          </a:lnRef>
-          <a:fillRef idx="0">
-            <a:schemeClr val="accent1"/>
-          </a:fillRef>
-          <a:effectRef idx="1">
-            <a:schemeClr val="accent1"/>
-          </a:effectRef>
-          <a:fontRef idx="minor">
-            <a:schemeClr val="tx1"/>
-          </a:fontRef>
-        </p:style>
-      </p:cxnSp>
-      <p:cxnSp>
-        <p:nvCxnSpPr>
-          <p:cNvPr id="13" name="Straight Arrow Connector 12"/>
-          <p:cNvCxnSpPr>
-            <a:endCxn id="6" idx="0"/>
-          </p:cNvCxnSpPr>
-          <p:nvPr/>
-        </p:nvCxnSpPr>
-        <p:spPr>
-          <a:xfrm>
-            <a:off x="5227573" y="2936449"/>
-            <a:ext cx="1643563" cy="882459"/>
-          </a:xfrm>
-          <a:prstGeom prst="straightConnector1">
-            <a:avLst/>
-          </a:prstGeom>
-          <a:ln w="38100">
-            <a:solidFill>
-              <a:srgbClr val="008000"/>
-            </a:solidFill>
-            <a:headEnd type="arrow"/>
-            <a:tailEnd type="none"/>
           </a:ln>
         </p:spPr>
         <p:style>
@@ -6984,104 +6866,263 @@
           </a:p>
         </p:txBody>
       </p:sp>
-      <p:sp>
-        <p:nvSpPr>
-          <p:cNvPr id="23" name="TextBox 22"/>
-          <p:cNvSpPr txBox="1"/>
+      <p:grpSp>
+        <p:nvGrpSpPr>
+          <p:cNvPr id="15" name="Group 14"/>
+          <p:cNvGrpSpPr/>
           <p:nvPr/>
-        </p:nvSpPr>
-        <p:spPr>
+        </p:nvGrpSpPr>
+        <p:grpSpPr>
           <a:xfrm>
-            <a:off x="2664815" y="2936449"/>
-            <a:ext cx="593432" cy="369332"/>
+            <a:off x="2252725" y="2936449"/>
+            <a:ext cx="1670790" cy="882459"/>
+            <a:chOff x="2252725" y="2936449"/>
+            <a:chExt cx="1670790" cy="882459"/>
           </a:xfrm>
-          <a:prstGeom prst="rect">
-            <a:avLst/>
-          </a:prstGeom>
-          <a:noFill/>
-        </p:spPr>
-        <p:txBody>
-          <a:bodyPr wrap="none" rtlCol="0">
-            <a:spAutoFit/>
-          </a:bodyPr>
-          <a:lstStyle/>
-          <a:p>
-            <a:r>
-              <a:rPr lang="en-US" dirty="0"/>
-              <a:t>2</a:t>
-            </a:r>
-            <a:r>
-              <a:rPr lang="en-US" dirty="0" smtClean="0"/>
-              <a:t>4.7</a:t>
-            </a:r>
-            <a:endParaRPr lang="en-US" dirty="0"/>
-          </a:p>
-        </p:txBody>
-      </p:sp>
-      <p:sp>
-        <p:nvSpPr>
-          <p:cNvPr id="24" name="TextBox 23"/>
-          <p:cNvSpPr txBox="1"/>
+        </p:grpSpPr>
+        <p:cxnSp>
+          <p:nvCxnSpPr>
+            <p:cNvPr id="11" name="Straight Arrow Connector 10"/>
+            <p:cNvCxnSpPr/>
+            <p:nvPr/>
+          </p:nvCxnSpPr>
+          <p:spPr>
+            <a:xfrm flipH="1">
+              <a:off x="2252725" y="2936449"/>
+              <a:ext cx="1670790" cy="882459"/>
+            </a:xfrm>
+            <a:prstGeom prst="straightConnector1">
+              <a:avLst/>
+            </a:prstGeom>
+            <a:ln w="38100">
+              <a:solidFill>
+                <a:srgbClr val="008000"/>
+              </a:solidFill>
+              <a:headEnd type="arrow"/>
+              <a:tailEnd type="none"/>
+            </a:ln>
+          </p:spPr>
+          <p:style>
+            <a:lnRef idx="2">
+              <a:schemeClr val="accent1"/>
+            </a:lnRef>
+            <a:fillRef idx="0">
+              <a:schemeClr val="accent1"/>
+            </a:fillRef>
+            <a:effectRef idx="1">
+              <a:schemeClr val="accent1"/>
+            </a:effectRef>
+            <a:fontRef idx="minor">
+              <a:schemeClr val="tx1"/>
+            </a:fontRef>
+          </p:style>
+        </p:cxnSp>
+        <p:sp>
+          <p:nvSpPr>
+            <p:cNvPr id="23" name="TextBox 22"/>
+            <p:cNvSpPr txBox="1"/>
+            <p:nvPr/>
+          </p:nvSpPr>
+          <p:spPr>
+            <a:xfrm>
+              <a:off x="2664815" y="2936449"/>
+              <a:ext cx="593432" cy="369332"/>
+            </a:xfrm>
+            <a:prstGeom prst="rect">
+              <a:avLst/>
+            </a:prstGeom>
+            <a:noFill/>
+          </p:spPr>
+          <p:txBody>
+            <a:bodyPr wrap="none" rtlCol="0">
+              <a:spAutoFit/>
+            </a:bodyPr>
+            <a:lstStyle/>
+            <a:p>
+              <a:r>
+                <a:rPr lang="en-US" dirty="0"/>
+                <a:t>2</a:t>
+              </a:r>
+              <a:r>
+                <a:rPr lang="en-US" dirty="0" smtClean="0"/>
+                <a:t>4.7</a:t>
+              </a:r>
+              <a:endParaRPr lang="en-US" dirty="0"/>
+            </a:p>
+          </p:txBody>
+        </p:sp>
+      </p:grpSp>
+      <p:grpSp>
+        <p:nvGrpSpPr>
+          <p:cNvPr id="18" name="Group 17"/>
+          <p:cNvGrpSpPr/>
           <p:nvPr/>
-        </p:nvSpPr>
-        <p:spPr>
+        </p:nvGrpSpPr>
+        <p:grpSpPr>
           <a:xfrm>
-            <a:off x="4602482" y="3385844"/>
-            <a:ext cx="593920" cy="369332"/>
+            <a:off x="4575544" y="3175287"/>
+            <a:ext cx="620858" cy="643621"/>
+            <a:chOff x="4575544" y="3175287"/>
+            <a:chExt cx="620858" cy="643621"/>
           </a:xfrm>
-          <a:prstGeom prst="rect">
-            <a:avLst/>
-          </a:prstGeom>
-          <a:noFill/>
-        </p:spPr>
-        <p:txBody>
-          <a:bodyPr wrap="none" rtlCol="0">
-            <a:spAutoFit/>
-          </a:bodyPr>
-          <a:lstStyle/>
-          <a:p>
-            <a:r>
-              <a:rPr lang="en-US" dirty="0" smtClean="0"/>
-              <a:t>89.5</a:t>
-            </a:r>
-            <a:endParaRPr lang="en-US" dirty="0"/>
-          </a:p>
-        </p:txBody>
-      </p:sp>
-      <p:sp>
-        <p:nvSpPr>
-          <p:cNvPr id="25" name="TextBox 24"/>
-          <p:cNvSpPr txBox="1"/>
+        </p:grpSpPr>
+        <p:cxnSp>
+          <p:nvCxnSpPr>
+            <p:cNvPr id="12" name="Straight Arrow Connector 11"/>
+            <p:cNvCxnSpPr>
+              <a:stCxn id="5" idx="2"/>
+              <a:endCxn id="7" idx="0"/>
+            </p:cNvCxnSpPr>
+            <p:nvPr/>
+          </p:nvCxnSpPr>
+          <p:spPr>
+            <a:xfrm>
+              <a:off x="4575544" y="3175287"/>
+              <a:ext cx="0" cy="643621"/>
+            </a:xfrm>
+            <a:prstGeom prst="straightConnector1">
+              <a:avLst/>
+            </a:prstGeom>
+            <a:ln w="38100">
+              <a:solidFill>
+                <a:srgbClr val="008000"/>
+              </a:solidFill>
+              <a:headEnd type="arrow"/>
+              <a:tailEnd type="none"/>
+            </a:ln>
+          </p:spPr>
+          <p:style>
+            <a:lnRef idx="2">
+              <a:schemeClr val="accent1"/>
+            </a:lnRef>
+            <a:fillRef idx="0">
+              <a:schemeClr val="accent1"/>
+            </a:fillRef>
+            <a:effectRef idx="1">
+              <a:schemeClr val="accent1"/>
+            </a:effectRef>
+            <a:fontRef idx="minor">
+              <a:schemeClr val="tx1"/>
+            </a:fontRef>
+          </p:style>
+        </p:cxnSp>
+        <p:sp>
+          <p:nvSpPr>
+            <p:cNvPr id="24" name="TextBox 23"/>
+            <p:cNvSpPr txBox="1"/>
+            <p:nvPr/>
+          </p:nvSpPr>
+          <p:spPr>
+            <a:xfrm>
+              <a:off x="4602482" y="3385844"/>
+              <a:ext cx="593920" cy="369332"/>
+            </a:xfrm>
+            <a:prstGeom prst="rect">
+              <a:avLst/>
+            </a:prstGeom>
+            <a:noFill/>
+          </p:spPr>
+          <p:txBody>
+            <a:bodyPr wrap="none" rtlCol="0">
+              <a:spAutoFit/>
+            </a:bodyPr>
+            <a:lstStyle/>
+            <a:p>
+              <a:r>
+                <a:rPr lang="en-US" dirty="0" smtClean="0"/>
+                <a:t>89.5</a:t>
+              </a:r>
+              <a:endParaRPr lang="en-US" dirty="0"/>
+            </a:p>
+          </p:txBody>
+        </p:sp>
+      </p:grpSp>
+      <p:grpSp>
+        <p:nvGrpSpPr>
+          <p:cNvPr id="22" name="Group 21"/>
+          <p:cNvGrpSpPr/>
           <p:nvPr/>
-        </p:nvSpPr>
-        <p:spPr>
+        </p:nvGrpSpPr>
+        <p:grpSpPr>
           <a:xfrm>
-            <a:off x="5922146" y="2904183"/>
-            <a:ext cx="476926" cy="369332"/>
+            <a:off x="5227573" y="2904183"/>
+            <a:ext cx="1643563" cy="914725"/>
+            <a:chOff x="5227573" y="2904183"/>
+            <a:chExt cx="1643563" cy="914725"/>
           </a:xfrm>
-          <a:prstGeom prst="rect">
-            <a:avLst/>
-          </a:prstGeom>
-          <a:noFill/>
-        </p:spPr>
-        <p:txBody>
-          <a:bodyPr wrap="none" rtlCol="0">
-            <a:spAutoFit/>
-          </a:bodyPr>
-          <a:lstStyle/>
-          <a:p>
-            <a:r>
-              <a:rPr lang="en-US" dirty="0"/>
-              <a:t>7</a:t>
-            </a:r>
-            <a:r>
-              <a:rPr lang="en-US" dirty="0" smtClean="0"/>
-              <a:t>.3</a:t>
-            </a:r>
-            <a:endParaRPr lang="en-US" dirty="0"/>
-          </a:p>
-        </p:txBody>
-      </p:sp>
+        </p:grpSpPr>
+        <p:cxnSp>
+          <p:nvCxnSpPr>
+            <p:cNvPr id="13" name="Straight Arrow Connector 12"/>
+            <p:cNvCxnSpPr/>
+            <p:nvPr/>
+          </p:nvCxnSpPr>
+          <p:spPr>
+            <a:xfrm>
+              <a:off x="5227573" y="2936449"/>
+              <a:ext cx="1643563" cy="882459"/>
+            </a:xfrm>
+            <a:prstGeom prst="straightConnector1">
+              <a:avLst/>
+            </a:prstGeom>
+            <a:ln w="38100">
+              <a:solidFill>
+                <a:srgbClr val="008000"/>
+              </a:solidFill>
+              <a:headEnd type="arrow"/>
+              <a:tailEnd type="none"/>
+            </a:ln>
+          </p:spPr>
+          <p:style>
+            <a:lnRef idx="2">
+              <a:schemeClr val="accent1"/>
+            </a:lnRef>
+            <a:fillRef idx="0">
+              <a:schemeClr val="accent1"/>
+            </a:fillRef>
+            <a:effectRef idx="1">
+              <a:schemeClr val="accent1"/>
+            </a:effectRef>
+            <a:fontRef idx="minor">
+              <a:schemeClr val="tx1"/>
+            </a:fontRef>
+          </p:style>
+        </p:cxnSp>
+        <p:sp>
+          <p:nvSpPr>
+            <p:cNvPr id="25" name="TextBox 24"/>
+            <p:cNvSpPr txBox="1"/>
+            <p:nvPr/>
+          </p:nvSpPr>
+          <p:spPr>
+            <a:xfrm>
+              <a:off x="5922146" y="2904183"/>
+              <a:ext cx="476926" cy="369332"/>
+            </a:xfrm>
+            <a:prstGeom prst="rect">
+              <a:avLst/>
+            </a:prstGeom>
+            <a:noFill/>
+          </p:spPr>
+          <p:txBody>
+            <a:bodyPr wrap="none" rtlCol="0">
+              <a:spAutoFit/>
+            </a:bodyPr>
+            <a:lstStyle/>
+            <a:p>
+              <a:r>
+                <a:rPr lang="en-US" dirty="0"/>
+                <a:t>7</a:t>
+              </a:r>
+              <a:r>
+                <a:rPr lang="en-US" dirty="0" smtClean="0"/>
+                <a:t>.3</a:t>
+              </a:r>
+              <a:endParaRPr lang="en-US" dirty="0"/>
+            </a:p>
+          </p:txBody>
+        </p:sp>
+      </p:grpSp>
       <p:pic>
         <p:nvPicPr>
           <p:cNvPr id="3" name="Picture 2" descr="CodeCogsEqn.gif"/>
@@ -7359,7 +7400,7 @@
   <p:timing>
     <p:tnLst>
       <p:par>
-        <p:cTn xmlns:p14="http://schemas.microsoft.com/office/powerpoint/2010/main" id="1" dur="indefinite" restart="never" nodeType="tmRoot">
+        <p:cTn id="1" dur="indefinite" restart="never" nodeType="tmRoot">
           <p:childTnLst>
             <p:seq concurrent="1" nextAc="seek">
               <p:cTn id="2" dur="indefinite" nodeType="mainSeq">
@@ -7368,9 +7409,6 @@
                     <p:cTn id="3" fill="hold">
                       <p:stCondLst>
                         <p:cond delay="indefinite"/>
-                        <p:cond evt="onBegin" delay="0">
-                          <p:tn val="2"/>
-                        </p:cond>
                       </p:stCondLst>
                       <p:childTnLst>
                         <p:par>
@@ -7380,14 +7418,137 @@
                             </p:stCondLst>
                             <p:childTnLst>
                               <p:par>
-                                <p:cTn id="5" presetID="1" presetClass="entr" presetSubtype="0" fill="hold" grpId="0" nodeType="withEffect">
+                                <p:cTn id="5" presetID="22" presetClass="entr" presetSubtype="4" repeatCount="4000" fill="hold" nodeType="clickEffect">
+                                  <p:stCondLst>
+                                    <p:cond delay="500"/>
+                                  </p:stCondLst>
+                                  <p:childTnLst>
+                                    <p:set>
+                                      <p:cBhvr>
+                                        <p:cTn id="6" dur="1" fill="hold">
+                                          <p:stCondLst>
+                                            <p:cond delay="0"/>
+                                          </p:stCondLst>
+                                        </p:cTn>
+                                        <p:tgtEl>
+                                          <p:spTgt spid="22"/>
+                                        </p:tgtEl>
+                                        <p:attrNameLst>
+                                          <p:attrName>style.visibility</p:attrName>
+                                        </p:attrNameLst>
+                                      </p:cBhvr>
+                                      <p:to>
+                                        <p:strVal val="visible"/>
+                                      </p:to>
+                                    </p:set>
+                                    <p:animEffect transition="in" filter="wipe(down)">
+                                      <p:cBhvr>
+                                        <p:cTn id="7" dur="1300"/>
+                                        <p:tgtEl>
+                                          <p:spTgt spid="22"/>
+                                        </p:tgtEl>
+                                      </p:cBhvr>
+                                    </p:animEffect>
+                                  </p:childTnLst>
+                                </p:cTn>
+                              </p:par>
+                              <p:par>
+                                <p:cTn id="8" presetID="22" presetClass="entr" presetSubtype="4" repeatCount="4000" fill="hold" nodeType="withEffect">
+                                  <p:stCondLst>
+                                    <p:cond delay="500"/>
+                                  </p:stCondLst>
+                                  <p:childTnLst>
+                                    <p:set>
+                                      <p:cBhvr>
+                                        <p:cTn id="9" dur="1" fill="hold">
+                                          <p:stCondLst>
+                                            <p:cond delay="0"/>
+                                          </p:stCondLst>
+                                        </p:cTn>
+                                        <p:tgtEl>
+                                          <p:spTgt spid="18"/>
+                                        </p:tgtEl>
+                                        <p:attrNameLst>
+                                          <p:attrName>style.visibility</p:attrName>
+                                        </p:attrNameLst>
+                                      </p:cBhvr>
+                                      <p:to>
+                                        <p:strVal val="visible"/>
+                                      </p:to>
+                                    </p:set>
+                                    <p:animEffect transition="in" filter="wipe(down)">
+                                      <p:cBhvr>
+                                        <p:cTn id="10" dur="1250"/>
+                                        <p:tgtEl>
+                                          <p:spTgt spid="18"/>
+                                        </p:tgtEl>
+                                      </p:cBhvr>
+                                    </p:animEffect>
+                                  </p:childTnLst>
+                                </p:cTn>
+                              </p:par>
+                              <p:par>
+                                <p:cTn id="11" presetID="22" presetClass="entr" presetSubtype="4" repeatCount="4000" fill="hold" nodeType="withEffect">
+                                  <p:stCondLst>
+                                    <p:cond delay="500"/>
+                                  </p:stCondLst>
+                                  <p:childTnLst>
+                                    <p:set>
+                                      <p:cBhvr>
+                                        <p:cTn id="12" dur="1" fill="hold">
+                                          <p:stCondLst>
+                                            <p:cond delay="0"/>
+                                          </p:stCondLst>
+                                        </p:cTn>
+                                        <p:tgtEl>
+                                          <p:spTgt spid="15"/>
+                                        </p:tgtEl>
+                                        <p:attrNameLst>
+                                          <p:attrName>style.visibility</p:attrName>
+                                        </p:attrNameLst>
+                                      </p:cBhvr>
+                                      <p:to>
+                                        <p:strVal val="visible"/>
+                                      </p:to>
+                                    </p:set>
+                                    <p:animEffect transition="in" filter="wipe(down)">
+                                      <p:cBhvr>
+                                        <p:cTn id="13" dur="1250"/>
+                                        <p:tgtEl>
+                                          <p:spTgt spid="15"/>
+                                        </p:tgtEl>
+                                      </p:cBhvr>
+                                    </p:animEffect>
+                                  </p:childTnLst>
+                                </p:cTn>
+                              </p:par>
+                            </p:childTnLst>
+                          </p:cTn>
+                        </p:par>
+                      </p:childTnLst>
+                    </p:cTn>
+                  </p:par>
+                  <p:par>
+                    <p:cTn id="14" fill="hold">
+                      <p:stCondLst>
+                        <p:cond delay="indefinite"/>
+                      </p:stCondLst>
+                      <p:childTnLst>
+                        <p:par>
+                          <p:cTn id="15" fill="hold">
+                            <p:stCondLst>
+                              <p:cond delay="0"/>
+                            </p:stCondLst>
+                            <p:childTnLst>
+                              <p:par>
+                                <p:cTn id="16" presetID="1" presetClass="entr" presetSubtype="0" fill="hold" grpId="0" nodeType="clickEffect">
                                   <p:stCondLst>
                                     <p:cond delay="0"/>
                                   </p:stCondLst>
                                   <p:childTnLst>
                                     <p:set>
                                       <p:cBhvr>
-                                        <p:cTn id="6" dur="1" fill="hold">
+                                        <p:cTn id="17" dur="1" fill="hold">
                                           <p:stCondLst>
                                             <p:cond delay="0"/>
                                           </p:stCondLst>
@@ -7407,113 +7568,14 @@
                                 </p:cTn>
                               </p:par>
                               <p:par>
-                                <p:cTn id="7" presetID="1" presetClass="entr" presetSubtype="0" fill="hold" grpId="0" nodeType="withEffect">
+                                <p:cTn id="18" presetID="1" presetClass="entr" presetSubtype="0" fill="hold" nodeType="withEffect">
                                   <p:stCondLst>
                                     <p:cond delay="0"/>
                                   </p:stCondLst>
                                   <p:childTnLst>
                                     <p:set>
                                       <p:cBhvr>
-                                        <p:cTn id="8" dur="1" fill="hold">
-                                          <p:stCondLst>
-                                            <p:cond delay="0"/>
-                                          </p:stCondLst>
-                                        </p:cTn>
-                                        <p:tgtEl>
-                                          <p:spTgt spid="23"/>
-                                        </p:tgtEl>
-                                        <p:attrNameLst>
-                                          <p:attrName>style.visibility</p:attrName>
-                                        </p:attrNameLst>
-                                      </p:cBhvr>
-                                      <p:to>
-                                        <p:strVal val="visible"/>
-                                      </p:to>
-                                    </p:set>
-                                  </p:childTnLst>
-                                </p:cTn>
-                              </p:par>
-                              <p:par>
-                                <p:cTn id="9" presetID="1" presetClass="entr" presetSubtype="0" fill="hold" grpId="0" nodeType="withEffect">
-                                  <p:stCondLst>
-                                    <p:cond delay="0"/>
-                                  </p:stCondLst>
-                                  <p:childTnLst>
-                                    <p:set>
-                                      <p:cBhvr>
-                                        <p:cTn id="10" dur="1" fill="hold">
-                                          <p:stCondLst>
-                                            <p:cond delay="0"/>
-                                          </p:stCondLst>
-                                        </p:cTn>
-                                        <p:tgtEl>
-                                          <p:spTgt spid="24"/>
-                                        </p:tgtEl>
-                                        <p:attrNameLst>
-                                          <p:attrName>style.visibility</p:attrName>
-                                        </p:attrNameLst>
-                                      </p:cBhvr>
-                                      <p:to>
-                                        <p:strVal val="visible"/>
-                                      </p:to>
-                                    </p:set>
-                                  </p:childTnLst>
-                                </p:cTn>
-                              </p:par>
-                              <p:par>
-                                <p:cTn id="11" presetID="1" presetClass="entr" presetSubtype="0" fill="hold" grpId="0" nodeType="withEffect">
-                                  <p:stCondLst>
-                                    <p:cond delay="0"/>
-                                  </p:stCondLst>
-                                  <p:childTnLst>
-                                    <p:set>
-                                      <p:cBhvr>
-                                        <p:cTn id="12" dur="1" fill="hold">
-                                          <p:stCondLst>
-                                            <p:cond delay="0"/>
-                                          </p:stCondLst>
-                                        </p:cTn>
-                                        <p:tgtEl>
-                                          <p:spTgt spid="25"/>
-                                        </p:tgtEl>
-                                        <p:attrNameLst>
-                                          <p:attrName>style.visibility</p:attrName>
-                                        </p:attrNameLst>
-                                      </p:cBhvr>
-                                      <p:to>
-                                        <p:strVal val="visible"/>
-                                      </p:to>
-                                    </p:set>
-                                  </p:childTnLst>
-                                </p:cTn>
-                              </p:par>
-                            </p:childTnLst>
-                          </p:cTn>
-                        </p:par>
-                      </p:childTnLst>
-                    </p:cTn>
-                  </p:par>
-                  <p:par>
-                    <p:cTn id="13" fill="hold">
-                      <p:stCondLst>
-                        <p:cond delay="indefinite"/>
-                      </p:stCondLst>
-                      <p:childTnLst>
-                        <p:par>
-                          <p:cTn id="14" fill="hold">
-                            <p:stCondLst>
-                              <p:cond delay="0"/>
-                            </p:stCondLst>
-                            <p:childTnLst>
-                              <p:par>
-                                <p:cTn id="15" presetID="1" presetClass="entr" presetSubtype="0" fill="hold" nodeType="clickEffect">
-                                  <p:stCondLst>
-                                    <p:cond delay="0"/>
-                                  </p:stCondLst>
-                                  <p:childTnLst>
-                                    <p:set>
-                                      <p:cBhvr>
-                                        <p:cTn id="16" dur="1" fill="hold">
+                                        <p:cTn id="19" dur="1" fill="hold">
                                           <p:stCondLst>
                                             <p:cond delay="0"/>
                                           </p:stCondLst>
@@ -7539,26 +7601,26 @@
                     </p:cTn>
                   </p:par>
                   <p:par>
-                    <p:cTn id="17" fill="hold">
+                    <p:cTn id="20" fill="hold">
                       <p:stCondLst>
                         <p:cond delay="indefinite"/>
                       </p:stCondLst>
                       <p:childTnLst>
                         <p:par>
-                          <p:cTn id="18" fill="hold">
+                          <p:cTn id="21" fill="hold">
                             <p:stCondLst>
                               <p:cond delay="0"/>
                             </p:stCondLst>
                             <p:childTnLst>
                               <p:par>
-                                <p:cTn id="19" presetID="1" presetClass="entr" presetSubtype="0" fill="hold" nodeType="clickEffect">
+                                <p:cTn id="22" presetID="1" presetClass="entr" presetSubtype="0" fill="hold" nodeType="clickEffect">
                                   <p:stCondLst>
                                     <p:cond delay="0"/>
                                   </p:stCondLst>
                                   <p:childTnLst>
                                     <p:set>
                                       <p:cBhvr>
-                                        <p:cTn id="20" dur="1" fill="hold">
+                                        <p:cTn id="23" dur="1" fill="hold">
                                           <p:stCondLst>
                                             <p:cond delay="0"/>
                                           </p:stCondLst>
@@ -7584,26 +7646,26 @@
                     </p:cTn>
                   </p:par>
                   <p:par>
-                    <p:cTn id="21" fill="hold">
+                    <p:cTn id="24" fill="hold">
                       <p:stCondLst>
                         <p:cond delay="indefinite"/>
                       </p:stCondLst>
                       <p:childTnLst>
                         <p:par>
-                          <p:cTn id="22" fill="hold">
+                          <p:cTn id="25" fill="hold">
                             <p:stCondLst>
                               <p:cond delay="0"/>
                             </p:stCondLst>
                             <p:childTnLst>
                               <p:par>
-                                <p:cTn id="23" presetID="1" presetClass="entr" presetSubtype="0" fill="hold" nodeType="clickEffect">
+                                <p:cTn id="26" presetID="1" presetClass="entr" presetSubtype="0" fill="hold" nodeType="clickEffect">
                                   <p:stCondLst>
                                     <p:cond delay="0"/>
                                   </p:stCondLst>
                                   <p:childTnLst>
                                     <p:set>
                                       <p:cBhvr>
-                                        <p:cTn id="24" dur="1" fill="hold">
+                                        <p:cTn id="27" dur="1" fill="hold">
                                           <p:stCondLst>
                                             <p:cond delay="0"/>
                                           </p:stCondLst>
@@ -7651,9 +7713,6 @@
     </p:tnLst>
     <p:bldLst>
       <p:bldP spid="20" grpId="0"/>
-      <p:bldP spid="23" grpId="0"/>
-      <p:bldP spid="24" grpId="0"/>
-      <p:bldP spid="25" grpId="0"/>
     </p:bldLst>
   </p:timing>
 </p:sld>
@@ -7827,7 +7886,7 @@
   <p:timing>
     <p:tnLst>
       <p:par>
-        <p:cTn xmlns:p14="http://schemas.microsoft.com/office/powerpoint/2010/main" id="1" dur="indefinite" restart="never" nodeType="tmRoot"/>
+        <p:cTn id="1" dur="indefinite" restart="never" nodeType="tmRoot"/>
       </p:par>
     </p:tnLst>
   </p:timing>
@@ -7897,11 +7956,7 @@
           <a:p>
             <a:r>
               <a:rPr lang="en-US" dirty="0" smtClean="0"/>
-              <a:t>Ran </a:t>
-            </a:r>
-            <a:r>
-              <a:rPr lang="en-US" dirty="0" smtClean="0"/>
-              <a:t>on 10 machine cluster</a:t>
+              <a:t>Ran on 10 machine cluster</a:t>
             </a:r>
             <a:endParaRPr lang="en-US" dirty="0"/>
           </a:p>
@@ -7988,7 +8043,7 @@
   <p:timing>
     <p:tnLst>
       <p:par>
-        <p:cTn xmlns:p14="http://schemas.microsoft.com/office/powerpoint/2010/main" id="1" dur="indefinite" restart="never" nodeType="tmRoot"/>
+        <p:cTn id="1" dur="indefinite" restart="never" nodeType="tmRoot"/>
       </p:par>
     </p:tnLst>
   </p:timing>
@@ -8570,7 +8625,7 @@
   <a:extraClrSchemeLst/>
   <a:extLst>
     <a:ext uri="{05A4C25C-085E-4340-85A3-A5531E510DB2}">
-      <thm15:themeFamily xmlns:thm15="http://schemas.microsoft.com/office/thememl/2012/main" xmlns="" name="Office Theme" id="{62F939B6-93AF-4DB8-9C6B-D6C7DFDC589F}" vid="{4A3C46E8-61CC-4603-A589-7422A47A8E4A}"/>
+      <thm15:themeFamily xmlns:thm15="http://schemas.microsoft.com/office/thememl/2012/main" name="Office Theme" id="{62F939B6-93AF-4DB8-9C6B-D6C7DFDC589F}" vid="{4A3C46E8-61CC-4603-A589-7422A47A8E4A}"/>
     </a:ext>
   </a:extLst>
 </a:theme>

</xml_diff>